<commit_message>
worked on level 3 again, but its too dark in some places and the platforms move too fast. So need to change that. However, gameplay has been recorded and will be uploaded to powerpoint soon.
</commit_message>
<xml_diff>
--- a/Capstone Presentation.pptx
+++ b/Capstone Presentation.pptx
@@ -114,6 +114,11 @@
       </a:defRPr>
     </a:lvl9pPr>
   </p:defaultTextStyle>
+  <p:extLst>
+    <p:ext uri="{EFAFB233-063F-42B5-8137-9DF3F51BA10A}">
+      <p15:sldGuideLst xmlns:p15="http://schemas.microsoft.com/office/powerpoint/2012/main"/>
+    </p:ext>
+  </p:extLst>
 </p:presentation>
 </file>
 
@@ -287,7 +292,7 @@
           <a:p>
             <a:fld id="{3030D6BD-4E46-430A-9419-BBA80AEF421D}" type="datetimeFigureOut">
               <a:rPr lang="en-US" smtClean="0"/>
-              <a:t>4/27/2020</a:t>
+              <a:t>4/28/2020</a:t>
             </a:fld>
             <a:endParaRPr lang="en-US"/>
           </a:p>
@@ -554,7 +559,7 @@
           <a:p>
             <a:fld id="{3030D6BD-4E46-430A-9419-BBA80AEF421D}" type="datetimeFigureOut">
               <a:rPr lang="en-US" smtClean="0"/>
-              <a:t>4/27/2020</a:t>
+              <a:t>4/28/2020</a:t>
             </a:fld>
             <a:endParaRPr lang="en-US"/>
           </a:p>
@@ -785,7 +790,7 @@
           <a:p>
             <a:fld id="{3030D6BD-4E46-430A-9419-BBA80AEF421D}" type="datetimeFigureOut">
               <a:rPr lang="en-US" smtClean="0"/>
-              <a:t>4/27/2020</a:t>
+              <a:t>4/28/2020</a:t>
             </a:fld>
             <a:endParaRPr lang="en-US"/>
           </a:p>
@@ -1095,7 +1100,7 @@
           <a:p>
             <a:fld id="{3030D6BD-4E46-430A-9419-BBA80AEF421D}" type="datetimeFigureOut">
               <a:rPr lang="en-US" smtClean="0"/>
-              <a:t>4/27/2020</a:t>
+              <a:t>4/28/2020</a:t>
             </a:fld>
             <a:endParaRPr lang="en-US"/>
           </a:p>
@@ -1568,7 +1573,7 @@
           <a:p>
             <a:fld id="{3030D6BD-4E46-430A-9419-BBA80AEF421D}" type="datetimeFigureOut">
               <a:rPr lang="en-US" smtClean="0"/>
-              <a:t>4/27/2020</a:t>
+              <a:t>4/28/2020</a:t>
             </a:fld>
             <a:endParaRPr lang="en-US"/>
           </a:p>
@@ -2115,7 +2120,7 @@
           <a:p>
             <a:fld id="{3030D6BD-4E46-430A-9419-BBA80AEF421D}" type="datetimeFigureOut">
               <a:rPr lang="en-US" smtClean="0"/>
-              <a:t>4/27/2020</a:t>
+              <a:t>4/28/2020</a:t>
             </a:fld>
             <a:endParaRPr lang="en-US"/>
           </a:p>
@@ -2889,7 +2894,7 @@
           <a:p>
             <a:fld id="{3030D6BD-4E46-430A-9419-BBA80AEF421D}" type="datetimeFigureOut">
               <a:rPr lang="en-US" smtClean="0"/>
-              <a:t>4/27/2020</a:t>
+              <a:t>4/28/2020</a:t>
             </a:fld>
             <a:endParaRPr lang="en-US"/>
           </a:p>
@@ -3064,7 +3069,7 @@
           <a:p>
             <a:fld id="{3030D6BD-4E46-430A-9419-BBA80AEF421D}" type="datetimeFigureOut">
               <a:rPr lang="en-US" smtClean="0"/>
-              <a:t>4/27/2020</a:t>
+              <a:t>4/28/2020</a:t>
             </a:fld>
             <a:endParaRPr lang="en-US"/>
           </a:p>
@@ -3287,7 +3292,7 @@
           <a:p>
             <a:fld id="{3030D6BD-4E46-430A-9419-BBA80AEF421D}" type="datetimeFigureOut">
               <a:rPr lang="en-US" smtClean="0"/>
-              <a:t>4/27/2020</a:t>
+              <a:t>4/28/2020</a:t>
             </a:fld>
             <a:endParaRPr lang="en-US"/>
           </a:p>
@@ -3467,7 +3472,7 @@
           <a:p>
             <a:fld id="{3030D6BD-4E46-430A-9419-BBA80AEF421D}" type="datetimeFigureOut">
               <a:rPr lang="en-US" smtClean="0"/>
-              <a:t>4/27/2020</a:t>
+              <a:t>4/28/2020</a:t>
             </a:fld>
             <a:endParaRPr lang="en-US"/>
           </a:p>
@@ -3756,7 +3761,7 @@
           <a:p>
             <a:fld id="{3030D6BD-4E46-430A-9419-BBA80AEF421D}" type="datetimeFigureOut">
               <a:rPr lang="en-US" smtClean="0"/>
-              <a:t>4/27/2020</a:t>
+              <a:t>4/28/2020</a:t>
             </a:fld>
             <a:endParaRPr lang="en-US"/>
           </a:p>
@@ -3998,7 +4003,7 @@
           <a:p>
             <a:fld id="{3030D6BD-4E46-430A-9419-BBA80AEF421D}" type="datetimeFigureOut">
               <a:rPr lang="en-US" smtClean="0"/>
-              <a:t>4/27/2020</a:t>
+              <a:t>4/28/2020</a:t>
             </a:fld>
             <a:endParaRPr lang="en-US"/>
           </a:p>
@@ -4377,7 +4382,7 @@
           <a:p>
             <a:fld id="{3030D6BD-4E46-430A-9419-BBA80AEF421D}" type="datetimeFigureOut">
               <a:rPr lang="en-US" smtClean="0"/>
-              <a:t>4/27/2020</a:t>
+              <a:t>4/28/2020</a:t>
             </a:fld>
             <a:endParaRPr lang="en-US"/>
           </a:p>
@@ -4495,7 +4500,7 @@
           <a:p>
             <a:fld id="{3030D6BD-4E46-430A-9419-BBA80AEF421D}" type="datetimeFigureOut">
               <a:rPr lang="en-US" smtClean="0"/>
-              <a:t>4/27/2020</a:t>
+              <a:t>4/28/2020</a:t>
             </a:fld>
             <a:endParaRPr lang="en-US"/>
           </a:p>
@@ -4590,7 +4595,7 @@
           <a:p>
             <a:fld id="{3030D6BD-4E46-430A-9419-BBA80AEF421D}" type="datetimeFigureOut">
               <a:rPr lang="en-US" smtClean="0"/>
-              <a:t>4/27/2020</a:t>
+              <a:t>4/28/2020</a:t>
             </a:fld>
             <a:endParaRPr lang="en-US"/>
           </a:p>
@@ -4839,7 +4844,7 @@
           <a:p>
             <a:fld id="{3030D6BD-4E46-430A-9419-BBA80AEF421D}" type="datetimeFigureOut">
               <a:rPr lang="en-US" smtClean="0"/>
-              <a:t>4/27/2020</a:t>
+              <a:t>4/28/2020</a:t>
             </a:fld>
             <a:endParaRPr lang="en-US"/>
           </a:p>
@@ -5096,7 +5101,7 @@
           <a:p>
             <a:fld id="{3030D6BD-4E46-430A-9419-BBA80AEF421D}" type="datetimeFigureOut">
               <a:rPr lang="en-US" smtClean="0"/>
-              <a:t>4/27/2020</a:t>
+              <a:t>4/28/2020</a:t>
             </a:fld>
             <a:endParaRPr lang="en-US"/>
           </a:p>
@@ -5339,7 +5344,7 @@
           <a:p>
             <a:fld id="{3030D6BD-4E46-430A-9419-BBA80AEF421D}" type="datetimeFigureOut">
               <a:rPr lang="en-US" smtClean="0"/>
-              <a:t>4/27/2020</a:t>
+              <a:t>4/28/2020</a:t>
             </a:fld>
             <a:endParaRPr lang="en-US"/>
           </a:p>
@@ -6021,21 +6026,6 @@
           <a:p>
             <a:endParaRPr lang="en-US" dirty="0"/>
           </a:p>
-          <a:p>
-            <a:r>
-              <a:rPr lang="en-US" dirty="0"/>
-              <a:t>Thoughts?...</a:t>
-            </a:r>
-          </a:p>
-          <a:p>
-            <a:endParaRPr lang="en-US" dirty="0"/>
-          </a:p>
-          <a:p>
-            <a:r>
-              <a:rPr lang="en-US" dirty="0"/>
-              <a:t>Concerns?...</a:t>
-            </a:r>
-          </a:p>
         </p:txBody>
       </p:sp>
     </p:spTree>
@@ -6410,7 +6400,7 @@
           <a:p>
             <a:r>
               <a:rPr lang="en-US" dirty="0"/>
-              <a:t>Player movement blueprint</a:t>
+              <a:t>Player jumping blueprint</a:t>
             </a:r>
           </a:p>
         </p:txBody>
@@ -6448,10 +6438,10 @@
       </p:sp>
       <p:pic>
         <p:nvPicPr>
-          <p:cNvPr id="7" name="Picture 6" descr="A screenshot of a computer&#10;&#10;Description automatically generated">
+          <p:cNvPr id="5" name="Picture 4" descr="A screenshot of a computer screen&#10;&#10;Description automatically generated">
             <a:extLst>
               <a:ext uri="{FF2B5EF4-FFF2-40B4-BE49-F238E27FC236}">
-                <a16:creationId xmlns:a16="http://schemas.microsoft.com/office/drawing/2014/main" id="{E979AD0E-99CD-4AB3-92E8-6C6043A63B82}"/>
+                <a16:creationId xmlns:a16="http://schemas.microsoft.com/office/drawing/2014/main" id="{46D43D0F-7B69-43B8-BF28-8D8DB7CC8007}"/>
               </a:ext>
             </a:extLst>
           </p:cNvPr>
@@ -6474,8 +6464,8 @@
         </p:blipFill>
         <p:spPr>
           <a:xfrm>
-            <a:off x="559837" y="1744824"/>
-            <a:ext cx="11075436" cy="4664285"/>
+            <a:off x="304801" y="1736035"/>
+            <a:ext cx="11622156" cy="4357592"/>
           </a:xfrm>
           <a:prstGeom prst="rect">
             <a:avLst/>
@@ -6791,9 +6781,10 @@
               <a:buNone/>
             </a:pPr>
             <a:r>
-              <a:rPr lang="en-US" dirty="0"/>
-              <a:t>-The ability to win the game</a:t>
-            </a:r>
+              <a:rPr lang="en-US"/>
+              <a:t>-Scalability of UI</a:t>
+            </a:r>
+            <a:endParaRPr lang="en-US" dirty="0"/>
           </a:p>
           <a:p>
             <a:pPr marL="0" indent="0">

</xml_diff>